<commit_message>
Added location to merge and updated project status
</commit_message>
<xml_diff>
--- a/Status/LICOR Project Overview + Status 1.pptx
+++ b/Status/LICOR Project Overview + Status 1.pptx
@@ -13,6 +13,7 @@
     <p:sldId id="261" r:id="rId7"/>
     <p:sldId id="262" r:id="rId8"/>
     <p:sldId id="263" r:id="rId9"/>
+    <p:sldId id="265" r:id="rId10"/>
   </p:sldIdLst>
   <p:sldSz cx="12192000" cy="6858000"/>
   <p:notesSz cx="6858000" cy="9144000"/>
@@ -288,7 +289,7 @@
           <a:p>
             <a:fld id="{F9DCAA8B-8214-AB42-9DDE-39734251D010}" type="datetimeFigureOut">
               <a:rPr lang="en-US" smtClean="0"/>
-              <a:t>3/22/24</a:t>
+              <a:t>4/4/24</a:t>
             </a:fld>
             <a:endParaRPr lang="en-US"/>
           </a:p>
@@ -618,7 +619,7 @@
           <a:p>
             <a:fld id="{F9DCAA8B-8214-AB42-9DDE-39734251D010}" type="datetimeFigureOut">
               <a:rPr lang="en-US" smtClean="0"/>
-              <a:t>3/22/24</a:t>
+              <a:t>4/4/24</a:t>
             </a:fld>
             <a:endParaRPr lang="en-US"/>
           </a:p>
@@ -798,7 +799,7 @@
           <a:p>
             <a:fld id="{F9DCAA8B-8214-AB42-9DDE-39734251D010}" type="datetimeFigureOut">
               <a:rPr lang="en-US" smtClean="0"/>
-              <a:t>3/22/24</a:t>
+              <a:t>4/4/24</a:t>
             </a:fld>
             <a:endParaRPr lang="en-US"/>
           </a:p>
@@ -968,7 +969,7 @@
           <a:p>
             <a:fld id="{F9DCAA8B-8214-AB42-9DDE-39734251D010}" type="datetimeFigureOut">
               <a:rPr lang="en-US" smtClean="0"/>
-              <a:t>3/22/24</a:t>
+              <a:t>4/4/24</a:t>
             </a:fld>
             <a:endParaRPr lang="en-US"/>
           </a:p>
@@ -1245,7 +1246,7 @@
           <a:p>
             <a:fld id="{F9DCAA8B-8214-AB42-9DDE-39734251D010}" type="datetimeFigureOut">
               <a:rPr lang="en-US" smtClean="0"/>
-              <a:t>3/22/24</a:t>
+              <a:t>4/4/24</a:t>
             </a:fld>
             <a:endParaRPr lang="en-US"/>
           </a:p>
@@ -1639,7 +1640,7 @@
           <a:p>
             <a:fld id="{F9DCAA8B-8214-AB42-9DDE-39734251D010}" type="datetimeFigureOut">
               <a:rPr lang="en-US" smtClean="0"/>
-              <a:t>3/22/24</a:t>
+              <a:t>4/4/24</a:t>
             </a:fld>
             <a:endParaRPr lang="en-US"/>
           </a:p>
@@ -2116,7 +2117,7 @@
           <a:p>
             <a:fld id="{F9DCAA8B-8214-AB42-9DDE-39734251D010}" type="datetimeFigureOut">
               <a:rPr lang="en-US" smtClean="0"/>
-              <a:t>3/22/24</a:t>
+              <a:t>4/4/24</a:t>
             </a:fld>
             <a:endParaRPr lang="en-US"/>
           </a:p>
@@ -2234,7 +2235,7 @@
           <a:p>
             <a:fld id="{F9DCAA8B-8214-AB42-9DDE-39734251D010}" type="datetimeFigureOut">
               <a:rPr lang="en-US" smtClean="0"/>
-              <a:t>3/22/24</a:t>
+              <a:t>4/4/24</a:t>
             </a:fld>
             <a:endParaRPr lang="en-US"/>
           </a:p>
@@ -2329,7 +2330,7 @@
           <a:p>
             <a:fld id="{F9DCAA8B-8214-AB42-9DDE-39734251D010}" type="datetimeFigureOut">
               <a:rPr lang="en-US" smtClean="0"/>
-              <a:t>3/22/24</a:t>
+              <a:t>4/4/24</a:t>
             </a:fld>
             <a:endParaRPr lang="en-US"/>
           </a:p>
@@ -2675,7 +2676,7 @@
           <a:p>
             <a:fld id="{F9DCAA8B-8214-AB42-9DDE-39734251D010}" type="datetimeFigureOut">
               <a:rPr lang="en-US" smtClean="0"/>
-              <a:t>3/22/24</a:t>
+              <a:t>4/4/24</a:t>
             </a:fld>
             <a:endParaRPr lang="en-US"/>
           </a:p>
@@ -3063,7 +3064,7 @@
           <a:p>
             <a:fld id="{F9DCAA8B-8214-AB42-9DDE-39734251D010}" type="datetimeFigureOut">
               <a:rPr lang="en-US" smtClean="0"/>
-              <a:t>3/22/24</a:t>
+              <a:t>4/4/24</a:t>
             </a:fld>
             <a:endParaRPr lang="en-US"/>
           </a:p>
@@ -3341,7 +3342,7 @@
           <a:p>
             <a:fld id="{F9DCAA8B-8214-AB42-9DDE-39734251D010}" type="datetimeFigureOut">
               <a:rPr lang="en-US" smtClean="0"/>
-              <a:t>3/22/24</a:t>
+              <a:t>4/4/24</a:t>
             </a:fld>
             <a:endParaRPr lang="en-US"/>
           </a:p>
@@ -9643,6 +9644,675 @@
 </p:sld>
 </file>
 
+<file path=ppt/slides/slide9.xml><?xml version="1.0" encoding="utf-8"?>
+<p:sld xmlns:a="http://schemas.openxmlformats.org/drawingml/2006/main" xmlns:r="http://schemas.openxmlformats.org/officeDocument/2006/relationships" xmlns:p="http://schemas.openxmlformats.org/presentationml/2006/main">
+  <p:cSld>
+    <p:spTree>
+      <p:nvGrpSpPr>
+        <p:cNvPr id="1" name=""/>
+        <p:cNvGrpSpPr/>
+        <p:nvPr/>
+      </p:nvGrpSpPr>
+      <p:grpSpPr>
+        <a:xfrm>
+          <a:off x="0" y="0"/>
+          <a:ext cx="0" cy="0"/>
+          <a:chOff x="0" y="0"/>
+          <a:chExt cx="0" cy="0"/>
+        </a:xfrm>
+      </p:grpSpPr>
+      <p:sp>
+        <p:nvSpPr>
+          <p:cNvPr id="2" name="Title 1">
+            <a:extLst>
+              <a:ext uri="{FF2B5EF4-FFF2-40B4-BE49-F238E27FC236}">
+                <a16:creationId xmlns:a16="http://schemas.microsoft.com/office/drawing/2014/main" id="{1516DCD6-E7C6-B2EF-4C6B-4178CEB45F3D}"/>
+              </a:ext>
+            </a:extLst>
+          </p:cNvPr>
+          <p:cNvSpPr>
+            <a:spLocks noGrp="1"/>
+          </p:cNvSpPr>
+          <p:nvPr>
+            <p:ph type="title"/>
+          </p:nvPr>
+        </p:nvSpPr>
+        <p:spPr>
+          <a:xfrm>
+            <a:off x="922867" y="269522"/>
+            <a:ext cx="9601200" cy="1485900"/>
+          </a:xfrm>
+        </p:spPr>
+        <p:txBody>
+          <a:bodyPr>
+            <a:normAutofit fontScale="90000"/>
+          </a:bodyPr>
+          <a:lstStyle/>
+          <a:p>
+            <a:r>
+              <a:rPr lang="en-US" dirty="0"/>
+              <a:t>Project Status – April 8 </a:t>
+            </a:r>
+            <a:br>
+              <a:rPr lang="en-US" dirty="0"/>
+            </a:br>
+            <a:r>
+              <a:rPr lang="en-US" sz="3100" dirty="0"/>
+              <a:t>II. Data Ingestion and Cleaning/Wrangling</a:t>
+            </a:r>
+            <a:br>
+              <a:rPr lang="en-US" sz="4400" b="1" dirty="0"/>
+            </a:br>
+            <a:endParaRPr lang="en-US" dirty="0"/>
+          </a:p>
+        </p:txBody>
+      </p:sp>
+      <p:graphicFrame>
+        <p:nvGraphicFramePr>
+          <p:cNvPr id="14" name="Content Placeholder 13">
+            <a:extLst>
+              <a:ext uri="{FF2B5EF4-FFF2-40B4-BE49-F238E27FC236}">
+                <a16:creationId xmlns:a16="http://schemas.microsoft.com/office/drawing/2014/main" id="{7418B799-89F8-9A6B-6462-00D8E9183B81}"/>
+              </a:ext>
+            </a:extLst>
+          </p:cNvPr>
+          <p:cNvGraphicFramePr>
+            <a:graphicFrameLocks noGrp="1"/>
+          </p:cNvGraphicFramePr>
+          <p:nvPr>
+            <p:ph sz="half" idx="2"/>
+            <p:extLst>
+              <p:ext uri="{D42A27DB-BD31-4B8C-83A1-F6EECF244321}">
+                <p14:modId xmlns:p14="http://schemas.microsoft.com/office/powerpoint/2010/main" val="1487340824"/>
+              </p:ext>
+            </p:extLst>
+          </p:nvPr>
+        </p:nvGraphicFramePr>
+        <p:xfrm>
+          <a:off x="922867" y="1642533"/>
+          <a:ext cx="2607733" cy="2393245"/>
+        </p:xfrm>
+        <a:graphic>
+          <a:graphicData uri="http://schemas.openxmlformats.org/drawingml/2006/table">
+            <a:tbl>
+              <a:tblPr firstRow="1" bandRow="1">
+                <a:tableStyleId>{5940675A-B579-460E-94D1-54222C63F5DA}</a:tableStyleId>
+              </a:tblPr>
+              <a:tblGrid>
+                <a:gridCol w="2607733">
+                  <a:extLst>
+                    <a:ext uri="{9D8B030D-6E8A-4147-A177-3AD203B41FA5}">
+                      <a16:colId xmlns:a16="http://schemas.microsoft.com/office/drawing/2014/main" val="2128227627"/>
+                    </a:ext>
+                  </a:extLst>
+                </a:gridCol>
+              </a:tblGrid>
+              <a:tr h="829734">
+                <a:tc>
+                  <a:txBody>
+                    <a:bodyPr/>
+                    <a:lstStyle/>
+                    <a:p>
+                      <a:pPr algn="ctr"/>
+                      <a:r>
+                        <a:rPr lang="en-US" sz="2400" b="1" dirty="0"/>
+                        <a:t>Blocked</a:t>
+                      </a:r>
+                    </a:p>
+                  </a:txBody>
+                  <a:tcPr anchor="ctr">
+                    <a:solidFill>
+                      <a:schemeClr val="accent1"/>
+                    </a:solidFill>
+                  </a:tcPr>
+                </a:tc>
+                <a:extLst>
+                  <a:ext uri="{0D108BD9-81ED-4DB2-BD59-A6C34878D82A}">
+                    <a16:rowId xmlns:a16="http://schemas.microsoft.com/office/drawing/2014/main" val="2435820726"/>
+                  </a:ext>
+                </a:extLst>
+              </a:tr>
+              <a:tr h="1563511">
+                <a:tc>
+                  <a:txBody>
+                    <a:bodyPr/>
+                    <a:lstStyle/>
+                    <a:p>
+                      <a:endParaRPr lang="en-US" dirty="0"/>
+                    </a:p>
+                  </a:txBody>
+                  <a:tcPr/>
+                </a:tc>
+                <a:extLst>
+                  <a:ext uri="{0D108BD9-81ED-4DB2-BD59-A6C34878D82A}">
+                    <a16:rowId xmlns:a16="http://schemas.microsoft.com/office/drawing/2014/main" val="3084922051"/>
+                  </a:ext>
+                </a:extLst>
+              </a:tr>
+            </a:tbl>
+          </a:graphicData>
+        </a:graphic>
+      </p:graphicFrame>
+      <p:graphicFrame>
+        <p:nvGraphicFramePr>
+          <p:cNvPr id="15" name="Content Placeholder 13">
+            <a:extLst>
+              <a:ext uri="{FF2B5EF4-FFF2-40B4-BE49-F238E27FC236}">
+                <a16:creationId xmlns:a16="http://schemas.microsoft.com/office/drawing/2014/main" id="{49BA60BD-913B-7F97-24DD-4111E6F10B67}"/>
+              </a:ext>
+            </a:extLst>
+          </p:cNvPr>
+          <p:cNvGraphicFramePr>
+            <a:graphicFrameLocks/>
+          </p:cNvGraphicFramePr>
+          <p:nvPr>
+            <p:extLst>
+              <p:ext uri="{D42A27DB-BD31-4B8C-83A1-F6EECF244321}">
+                <p14:modId xmlns:p14="http://schemas.microsoft.com/office/powerpoint/2010/main" val="3754637524"/>
+              </p:ext>
+            </p:extLst>
+          </p:nvPr>
+        </p:nvGraphicFramePr>
+        <p:xfrm>
+          <a:off x="3730625" y="1642534"/>
+          <a:ext cx="2607733" cy="2793971"/>
+        </p:xfrm>
+        <a:graphic>
+          <a:graphicData uri="http://schemas.openxmlformats.org/drawingml/2006/table">
+            <a:tbl>
+              <a:tblPr firstRow="1" bandRow="1">
+                <a:tableStyleId>{5940675A-B579-460E-94D1-54222C63F5DA}</a:tableStyleId>
+              </a:tblPr>
+              <a:tblGrid>
+                <a:gridCol w="2607733">
+                  <a:extLst>
+                    <a:ext uri="{9D8B030D-6E8A-4147-A177-3AD203B41FA5}">
+                      <a16:colId xmlns:a16="http://schemas.microsoft.com/office/drawing/2014/main" val="2128227627"/>
+                    </a:ext>
+                  </a:extLst>
+                </a:gridCol>
+              </a:tblGrid>
+              <a:tr h="837619">
+                <a:tc>
+                  <a:txBody>
+                    <a:bodyPr/>
+                    <a:lstStyle/>
+                    <a:p>
+                      <a:pPr algn="ctr"/>
+                      <a:r>
+                        <a:rPr lang="en-US" sz="2400" b="1" dirty="0"/>
+                        <a:t>To Do</a:t>
+                      </a:r>
+                    </a:p>
+                  </a:txBody>
+                  <a:tcPr anchor="ctr">
+                    <a:solidFill>
+                      <a:schemeClr val="accent2"/>
+                    </a:solidFill>
+                  </a:tcPr>
+                </a:tc>
+                <a:extLst>
+                  <a:ext uri="{0D108BD9-81ED-4DB2-BD59-A6C34878D82A}">
+                    <a16:rowId xmlns:a16="http://schemas.microsoft.com/office/drawing/2014/main" val="2435820726"/>
+                  </a:ext>
+                </a:extLst>
+              </a:tr>
+              <a:tr h="342860">
+                <a:tc>
+                  <a:txBody>
+                    <a:bodyPr/>
+                    <a:lstStyle/>
+                    <a:p>
+                      <a:r>
+                        <a:rPr lang="en-US" dirty="0"/>
+                        <a:t>Read in harvest data</a:t>
+                      </a:r>
+                    </a:p>
+                  </a:txBody>
+                  <a:tcPr/>
+                </a:tc>
+                <a:extLst>
+                  <a:ext uri="{0D108BD9-81ED-4DB2-BD59-A6C34878D82A}">
+                    <a16:rowId xmlns:a16="http://schemas.microsoft.com/office/drawing/2014/main" val="188648871"/>
+                  </a:ext>
+                </a:extLst>
+              </a:tr>
+              <a:tr h="794814">
+                <a:tc>
+                  <a:txBody>
+                    <a:bodyPr/>
+                    <a:lstStyle/>
+                    <a:p>
+                      <a:r>
+                        <a:rPr lang="en-US" dirty="0"/>
+                        <a:t>Add addition columns to LICOR and perform feature analysis</a:t>
+                      </a:r>
+                    </a:p>
+                  </a:txBody>
+                  <a:tcPr/>
+                </a:tc>
+                <a:extLst>
+                  <a:ext uri="{0D108BD9-81ED-4DB2-BD59-A6C34878D82A}">
+                    <a16:rowId xmlns:a16="http://schemas.microsoft.com/office/drawing/2014/main" val="259421031"/>
+                  </a:ext>
+                </a:extLst>
+              </a:tr>
+              <a:tr h="676192">
+                <a:tc>
+                  <a:txBody>
+                    <a:bodyPr/>
+                    <a:lstStyle/>
+                    <a:p>
+                      <a:r>
+                        <a:rPr lang="en-US" dirty="0"/>
+                        <a:t>Combine LICOR with SHU and Visualize data</a:t>
+                      </a:r>
+                    </a:p>
+                  </a:txBody>
+                  <a:tcPr/>
+                </a:tc>
+                <a:extLst>
+                  <a:ext uri="{0D108BD9-81ED-4DB2-BD59-A6C34878D82A}">
+                    <a16:rowId xmlns:a16="http://schemas.microsoft.com/office/drawing/2014/main" val="4147229598"/>
+                  </a:ext>
+                </a:extLst>
+              </a:tr>
+            </a:tbl>
+          </a:graphicData>
+        </a:graphic>
+      </p:graphicFrame>
+      <p:graphicFrame>
+        <p:nvGraphicFramePr>
+          <p:cNvPr id="16" name="Content Placeholder 13">
+            <a:extLst>
+              <a:ext uri="{FF2B5EF4-FFF2-40B4-BE49-F238E27FC236}">
+                <a16:creationId xmlns:a16="http://schemas.microsoft.com/office/drawing/2014/main" id="{F3B9FDAE-B3DF-7FDE-6EF5-DEF3DEBC24B9}"/>
+              </a:ext>
+            </a:extLst>
+          </p:cNvPr>
+          <p:cNvGraphicFramePr>
+            <a:graphicFrameLocks/>
+          </p:cNvGraphicFramePr>
+          <p:nvPr>
+            <p:extLst>
+              <p:ext uri="{D42A27DB-BD31-4B8C-83A1-F6EECF244321}">
+                <p14:modId xmlns:p14="http://schemas.microsoft.com/office/powerpoint/2010/main" val="4285736532"/>
+              </p:ext>
+            </p:extLst>
+          </p:nvPr>
+        </p:nvGraphicFramePr>
+        <p:xfrm>
+          <a:off x="9328150" y="1642534"/>
+          <a:ext cx="2607733" cy="4882956"/>
+        </p:xfrm>
+        <a:graphic>
+          <a:graphicData uri="http://schemas.openxmlformats.org/drawingml/2006/table">
+            <a:tbl>
+              <a:tblPr firstRow="1" bandRow="1">
+                <a:tableStyleId>{5940675A-B579-460E-94D1-54222C63F5DA}</a:tableStyleId>
+              </a:tblPr>
+              <a:tblGrid>
+                <a:gridCol w="2607733">
+                  <a:extLst>
+                    <a:ext uri="{9D8B030D-6E8A-4147-A177-3AD203B41FA5}">
+                      <a16:colId xmlns:a16="http://schemas.microsoft.com/office/drawing/2014/main" val="2128227627"/>
+                    </a:ext>
+                  </a:extLst>
+                </a:gridCol>
+              </a:tblGrid>
+              <a:tr h="829733">
+                <a:tc>
+                  <a:txBody>
+                    <a:bodyPr/>
+                    <a:lstStyle/>
+                    <a:p>
+                      <a:pPr algn="ctr"/>
+                      <a:r>
+                        <a:rPr lang="en-US" sz="2400" b="1" dirty="0"/>
+                        <a:t>Completed</a:t>
+                      </a:r>
+                    </a:p>
+                  </a:txBody>
+                  <a:tcPr anchor="ctr">
+                    <a:solidFill>
+                      <a:schemeClr val="accent4"/>
+                    </a:solidFill>
+                  </a:tcPr>
+                </a:tc>
+                <a:extLst>
+                  <a:ext uri="{0D108BD9-81ED-4DB2-BD59-A6C34878D82A}">
+                    <a16:rowId xmlns:a16="http://schemas.microsoft.com/office/drawing/2014/main" val="2435820726"/>
+                  </a:ext>
+                </a:extLst>
+              </a:tr>
+              <a:tr h="667242">
+                <a:tc>
+                  <a:txBody>
+                    <a:bodyPr/>
+                    <a:lstStyle/>
+                    <a:p>
+                      <a:pPr marL="0" marR="0" lvl="0" indent="0" algn="l" defTabSz="914400" rtl="0" eaLnBrk="1" fontAlgn="auto" latinLnBrk="0" hangingPunct="1">
+                        <a:lnSpc>
+                          <a:spcPct val="100000"/>
+                        </a:lnSpc>
+                        <a:spcBef>
+                          <a:spcPts val="0"/>
+                        </a:spcBef>
+                        <a:spcAft>
+                          <a:spcPts val="0"/>
+                        </a:spcAft>
+                        <a:buClrTx/>
+                        <a:buSzTx/>
+                        <a:buFontTx/>
+                        <a:buNone/>
+                        <a:tabLst/>
+                        <a:defRPr/>
+                      </a:pPr>
+                      <a:r>
+                        <a:rPr lang="en-US" dirty="0"/>
+                        <a:t>Read in LICOR data from all different formats</a:t>
+                      </a:r>
+                    </a:p>
+                  </a:txBody>
+                  <a:tcPr/>
+                </a:tc>
+                <a:extLst>
+                  <a:ext uri="{0D108BD9-81ED-4DB2-BD59-A6C34878D82A}">
+                    <a16:rowId xmlns:a16="http://schemas.microsoft.com/office/drawing/2014/main" val="3084922051"/>
+                  </a:ext>
+                </a:extLst>
+              </a:tr>
+              <a:tr h="1134533">
+                <a:tc>
+                  <a:txBody>
+                    <a:bodyPr/>
+                    <a:lstStyle/>
+                    <a:p>
+                      <a:endParaRPr lang="en-US" dirty="0"/>
+                    </a:p>
+                  </a:txBody>
+                  <a:tcPr/>
+                </a:tc>
+                <a:extLst>
+                  <a:ext uri="{0D108BD9-81ED-4DB2-BD59-A6C34878D82A}">
+                    <a16:rowId xmlns:a16="http://schemas.microsoft.com/office/drawing/2014/main" val="188648871"/>
+                  </a:ext>
+                </a:extLst>
+              </a:tr>
+              <a:tr h="1083733">
+                <a:tc>
+                  <a:txBody>
+                    <a:bodyPr/>
+                    <a:lstStyle/>
+                    <a:p>
+                      <a:endParaRPr lang="en-US" dirty="0"/>
+                    </a:p>
+                  </a:txBody>
+                  <a:tcPr/>
+                </a:tc>
+                <a:extLst>
+                  <a:ext uri="{0D108BD9-81ED-4DB2-BD59-A6C34878D82A}">
+                    <a16:rowId xmlns:a16="http://schemas.microsoft.com/office/drawing/2014/main" val="2409157169"/>
+                  </a:ext>
+                </a:extLst>
+              </a:tr>
+              <a:tr h="1167715">
+                <a:tc>
+                  <a:txBody>
+                    <a:bodyPr/>
+                    <a:lstStyle/>
+                    <a:p>
+                      <a:endParaRPr lang="en-US" dirty="0"/>
+                    </a:p>
+                  </a:txBody>
+                  <a:tcPr/>
+                </a:tc>
+                <a:extLst>
+                  <a:ext uri="{0D108BD9-81ED-4DB2-BD59-A6C34878D82A}">
+                    <a16:rowId xmlns:a16="http://schemas.microsoft.com/office/drawing/2014/main" val="2943690651"/>
+                  </a:ext>
+                </a:extLst>
+              </a:tr>
+            </a:tbl>
+          </a:graphicData>
+        </a:graphic>
+      </p:graphicFrame>
+      <p:graphicFrame>
+        <p:nvGraphicFramePr>
+          <p:cNvPr id="17" name="Content Placeholder 13">
+            <a:extLst>
+              <a:ext uri="{FF2B5EF4-FFF2-40B4-BE49-F238E27FC236}">
+                <a16:creationId xmlns:a16="http://schemas.microsoft.com/office/drawing/2014/main" id="{DC5A6984-C960-CC78-0832-A352BB91D4D4}"/>
+              </a:ext>
+            </a:extLst>
+          </p:cNvPr>
+          <p:cNvGraphicFramePr>
+            <a:graphicFrameLocks/>
+          </p:cNvGraphicFramePr>
+          <p:nvPr>
+            <p:extLst>
+              <p:ext uri="{D42A27DB-BD31-4B8C-83A1-F6EECF244321}">
+                <p14:modId xmlns:p14="http://schemas.microsoft.com/office/powerpoint/2010/main" val="3093862185"/>
+              </p:ext>
+            </p:extLst>
+          </p:nvPr>
+        </p:nvGraphicFramePr>
+        <p:xfrm>
+          <a:off x="6538382" y="1642533"/>
+          <a:ext cx="2607733" cy="3996267"/>
+        </p:xfrm>
+        <a:graphic>
+          <a:graphicData uri="http://schemas.openxmlformats.org/drawingml/2006/table">
+            <a:tbl>
+              <a:tblPr firstRow="1" bandRow="1">
+                <a:tableStyleId>{5940675A-B579-460E-94D1-54222C63F5DA}</a:tableStyleId>
+              </a:tblPr>
+              <a:tblGrid>
+                <a:gridCol w="2607733">
+                  <a:extLst>
+                    <a:ext uri="{9D8B030D-6E8A-4147-A177-3AD203B41FA5}">
+                      <a16:colId xmlns:a16="http://schemas.microsoft.com/office/drawing/2014/main" val="2128227627"/>
+                    </a:ext>
+                  </a:extLst>
+                </a:gridCol>
+              </a:tblGrid>
+              <a:tr h="829734">
+                <a:tc>
+                  <a:txBody>
+                    <a:bodyPr/>
+                    <a:lstStyle/>
+                    <a:p>
+                      <a:pPr algn="ctr"/>
+                      <a:r>
+                        <a:rPr lang="en-US" sz="2400" b="1" dirty="0"/>
+                        <a:t>In Progress</a:t>
+                      </a:r>
+                    </a:p>
+                  </a:txBody>
+                  <a:tcPr anchor="ctr">
+                    <a:solidFill>
+                      <a:schemeClr val="accent5"/>
+                    </a:solidFill>
+                  </a:tcPr>
+                </a:tc>
+                <a:extLst>
+                  <a:ext uri="{0D108BD9-81ED-4DB2-BD59-A6C34878D82A}">
+                    <a16:rowId xmlns:a16="http://schemas.microsoft.com/office/drawing/2014/main" val="2435820726"/>
+                  </a:ext>
+                </a:extLst>
+              </a:tr>
+              <a:tr h="880533">
+                <a:tc>
+                  <a:txBody>
+                    <a:bodyPr/>
+                    <a:lstStyle/>
+                    <a:p>
+                      <a:r>
+                        <a:rPr lang="en-US" b="1" dirty="0"/>
+                        <a:t>Design interactive app to look at the data</a:t>
+                      </a:r>
+                    </a:p>
+                    <a:p>
+                      <a:r>
+                        <a:rPr lang="en-US" dirty="0"/>
+                        <a:t>- Build interactive app interface</a:t>
+                      </a:r>
+                    </a:p>
+                    <a:p>
+                      <a:r>
+                        <a:rPr lang="en-US" dirty="0"/>
+                        <a:t>- Graphs of SHU per genotype</a:t>
+                      </a:r>
+                    </a:p>
+                    <a:p>
+                      <a:r>
+                        <a:rPr lang="en-US" dirty="0"/>
+                        <a:t>- Anomaly/outlier graphs</a:t>
+                      </a:r>
+                    </a:p>
+                    <a:p>
+                      <a:endParaRPr lang="en-US" dirty="0"/>
+                    </a:p>
+                  </a:txBody>
+                  <a:tcPr/>
+                </a:tc>
+                <a:extLst>
+                  <a:ext uri="{0D108BD9-81ED-4DB2-BD59-A6C34878D82A}">
+                    <a16:rowId xmlns:a16="http://schemas.microsoft.com/office/drawing/2014/main" val="3084922051"/>
+                  </a:ext>
+                </a:extLst>
+              </a:tr>
+              <a:tr h="880533">
+                <a:tc>
+                  <a:txBody>
+                    <a:bodyPr/>
+                    <a:lstStyle/>
+                    <a:p>
+                      <a:pPr marL="0" marR="0" lvl="0" indent="0" algn="l" defTabSz="914400" rtl="0" eaLnBrk="1" fontAlgn="auto" latinLnBrk="0" hangingPunct="1">
+                        <a:lnSpc>
+                          <a:spcPct val="100000"/>
+                        </a:lnSpc>
+                        <a:spcBef>
+                          <a:spcPts val="0"/>
+                        </a:spcBef>
+                        <a:spcAft>
+                          <a:spcPts val="0"/>
+                        </a:spcAft>
+                        <a:buClrTx/>
+                        <a:buSzTx/>
+                        <a:buFontTx/>
+                        <a:buNone/>
+                        <a:tabLst/>
+                        <a:defRPr/>
+                      </a:pPr>
+                      <a:r>
+                        <a:rPr lang="en-US" dirty="0"/>
+                        <a:t>Clean LICOR Data</a:t>
+                      </a:r>
+                    </a:p>
+                  </a:txBody>
+                  <a:tcPr/>
+                </a:tc>
+                <a:extLst>
+                  <a:ext uri="{0D108BD9-81ED-4DB2-BD59-A6C34878D82A}">
+                    <a16:rowId xmlns:a16="http://schemas.microsoft.com/office/drawing/2014/main" val="2657011593"/>
+                  </a:ext>
+                </a:extLst>
+              </a:tr>
+            </a:tbl>
+          </a:graphicData>
+        </a:graphic>
+      </p:graphicFrame>
+      <p:graphicFrame>
+        <p:nvGraphicFramePr>
+          <p:cNvPr id="18" name="Content Placeholder 13">
+            <a:extLst>
+              <a:ext uri="{FF2B5EF4-FFF2-40B4-BE49-F238E27FC236}">
+                <a16:creationId xmlns:a16="http://schemas.microsoft.com/office/drawing/2014/main" id="{2B811AD4-E72C-6FAD-D983-8C44F05949DB}"/>
+              </a:ext>
+            </a:extLst>
+          </p:cNvPr>
+          <p:cNvGraphicFramePr>
+            <a:graphicFrameLocks/>
+          </p:cNvGraphicFramePr>
+          <p:nvPr/>
+        </p:nvGraphicFramePr>
+        <p:xfrm>
+          <a:off x="3730625" y="5385143"/>
+          <a:ext cx="2607733" cy="1289071"/>
+        </p:xfrm>
+        <a:graphic>
+          <a:graphicData uri="http://schemas.openxmlformats.org/drawingml/2006/table">
+            <a:tbl>
+              <a:tblPr firstRow="1" bandRow="1">
+                <a:tableStyleId>{5940675A-B579-460E-94D1-54222C63F5DA}</a:tableStyleId>
+              </a:tblPr>
+              <a:tblGrid>
+                <a:gridCol w="2607733">
+                  <a:extLst>
+                    <a:ext uri="{9D8B030D-6E8A-4147-A177-3AD203B41FA5}">
+                      <a16:colId xmlns:a16="http://schemas.microsoft.com/office/drawing/2014/main" val="2128227627"/>
+                    </a:ext>
+                  </a:extLst>
+                </a:gridCol>
+              </a:tblGrid>
+              <a:tr h="1289071">
+                <a:tc>
+                  <a:txBody>
+                    <a:bodyPr/>
+                    <a:lstStyle/>
+                    <a:p>
+                      <a:r>
+                        <a:rPr lang="en-US" dirty="0"/>
+                        <a:t>Work with </a:t>
+                      </a:r>
+                      <a:r>
+                        <a:rPr lang="en-US" dirty="0" err="1">
+                          <a:solidFill>
+                            <a:srgbClr val="7030A0"/>
+                          </a:solidFill>
+                        </a:rPr>
+                        <a:t>Ibrar</a:t>
+                      </a:r>
+                      <a:r>
+                        <a:rPr lang="en-US" dirty="0">
+                          <a:solidFill>
+                            <a:srgbClr val="7030A0"/>
+                          </a:solidFill>
+                        </a:rPr>
+                        <a:t> and team </a:t>
+                      </a:r>
+                      <a:r>
+                        <a:rPr lang="en-US" dirty="0"/>
+                        <a:t>to create standardized LICOR input for R Code</a:t>
+                      </a:r>
+                    </a:p>
+                  </a:txBody>
+                  <a:tcPr/>
+                </a:tc>
+                <a:extLst>
+                  <a:ext uri="{0D108BD9-81ED-4DB2-BD59-A6C34878D82A}">
+                    <a16:rowId xmlns:a16="http://schemas.microsoft.com/office/drawing/2014/main" val="188648871"/>
+                  </a:ext>
+                </a:extLst>
+              </a:tr>
+            </a:tbl>
+          </a:graphicData>
+        </a:graphic>
+      </p:graphicFrame>
+    </p:spTree>
+    <p:extLst>
+      <p:ext uri="{BB962C8B-B14F-4D97-AF65-F5344CB8AC3E}">
+        <p14:creationId xmlns:p14="http://schemas.microsoft.com/office/powerpoint/2010/main" val="4288604154"/>
+      </p:ext>
+    </p:extLst>
+  </p:cSld>
+  <p:clrMapOvr>
+    <a:masterClrMapping/>
+  </p:clrMapOvr>
+</p:sld>
+</file>
+
 <file path=ppt/theme/theme1.xml><?xml version="1.0" encoding="utf-8"?>
 <a:theme xmlns:a="http://schemas.openxmlformats.org/drawingml/2006/main" name="Crop">
   <a:themeElements>

</xml_diff>